<commit_message>
- Atualização do projeto - Prova teórica
</commit_message>
<xml_diff>
--- a/slides/revisão-api.pptx
+++ b/slides/revisão-api.pptx
@@ -18059,6 +18059,63 @@
           </a:ln>
         </p:spPr>
       </p:pic>
+      <p:sp>
+        <p:nvSpPr>
+          <p:cNvPr id="3" name="CaixaDeTexto 2">
+            <a:extLst>
+              <a:ext uri="{FF2B5EF4-FFF2-40B4-BE49-F238E27FC236}">
+                <a16:creationId xmlns:a16="http://schemas.microsoft.com/office/drawing/2014/main" id="{C201FF88-D21A-4512-B84C-0A2551CC4686}"/>
+              </a:ext>
+            </a:extLst>
+          </p:cNvPr>
+          <p:cNvSpPr txBox="1"/>
+          <p:nvPr/>
+        </p:nvSpPr>
+        <p:spPr>
+          <a:xfrm>
+            <a:off x="6534462" y="6392903"/>
+            <a:ext cx="2356320" cy="307777"/>
+          </a:xfrm>
+          <a:prstGeom prst="rect">
+            <a:avLst/>
+          </a:prstGeom>
+          <a:noFill/>
+        </p:spPr>
+        <p:txBody>
+          <a:bodyPr wrap="square" rtlCol="0">
+            <a:spAutoFit/>
+          </a:bodyPr>
+          <a:lstStyle/>
+          <a:p>
+            <a:pPr algn="just"/>
+            <a:r>
+              <a:rPr lang="pt-BR" dirty="0">
+                <a:solidFill>
+                  <a:schemeClr val="tx1">
+                    <a:lumMod val="85000"/>
+                    <a:lumOff val="15000"/>
+                  </a:schemeClr>
+                </a:solidFill>
+                <a:latin typeface="Verdana" panose="020B0604030504040204" pitchFamily="34" charset="0"/>
+                <a:ea typeface="Verdana" panose="020B0604030504040204" pitchFamily="34" charset="0"/>
+                <a:cs typeface="Calibri" panose="020F0502020204030204" pitchFamily="34" charset="0"/>
+              </a:rPr>
+              <a:t>Prof. Marcelo Bernardes</a:t>
+            </a:r>
+            <a:endParaRPr lang="pt-BR" b="1" dirty="0">
+              <a:solidFill>
+                <a:schemeClr val="tx1">
+                  <a:lumMod val="85000"/>
+                  <a:lumOff val="15000"/>
+                </a:schemeClr>
+              </a:solidFill>
+              <a:latin typeface="Verdana" panose="020B0604030504040204" pitchFamily="34" charset="0"/>
+              <a:ea typeface="Verdana" panose="020B0604030504040204" pitchFamily="34" charset="0"/>
+              <a:cs typeface="Calibri" panose="020F0502020204030204" pitchFamily="34" charset="0"/>
+            </a:endParaRPr>
+          </a:p>
+        </p:txBody>
+      </p:sp>
     </p:spTree>
   </p:cSld>
   <p:clrMapOvr>
@@ -18146,6 +18203,63 @@
               <a:ea typeface="Verdana"/>
               <a:cs typeface="Verdana"/>
               <a:sym typeface="Verdana"/>
+            </a:endParaRPr>
+          </a:p>
+        </p:txBody>
+      </p:sp>
+      <p:sp>
+        <p:nvSpPr>
+          <p:cNvPr id="3" name="CaixaDeTexto 2">
+            <a:extLst>
+              <a:ext uri="{FF2B5EF4-FFF2-40B4-BE49-F238E27FC236}">
+                <a16:creationId xmlns:a16="http://schemas.microsoft.com/office/drawing/2014/main" id="{3C314205-FE59-4919-A703-D1BFFB585773}"/>
+              </a:ext>
+            </a:extLst>
+          </p:cNvPr>
+          <p:cNvSpPr txBox="1"/>
+          <p:nvPr/>
+        </p:nvSpPr>
+        <p:spPr>
+          <a:xfrm>
+            <a:off x="6534462" y="6392903"/>
+            <a:ext cx="2356320" cy="307777"/>
+          </a:xfrm>
+          <a:prstGeom prst="rect">
+            <a:avLst/>
+          </a:prstGeom>
+          <a:noFill/>
+        </p:spPr>
+        <p:txBody>
+          <a:bodyPr wrap="square" rtlCol="0">
+            <a:spAutoFit/>
+          </a:bodyPr>
+          <a:lstStyle/>
+          <a:p>
+            <a:pPr algn="just"/>
+            <a:r>
+              <a:rPr lang="pt-BR" dirty="0">
+                <a:solidFill>
+                  <a:schemeClr val="tx1">
+                    <a:lumMod val="85000"/>
+                    <a:lumOff val="15000"/>
+                  </a:schemeClr>
+                </a:solidFill>
+                <a:latin typeface="Verdana" panose="020B0604030504040204" pitchFamily="34" charset="0"/>
+                <a:ea typeface="Verdana" panose="020B0604030504040204" pitchFamily="34" charset="0"/>
+                <a:cs typeface="Calibri" panose="020F0502020204030204" pitchFamily="34" charset="0"/>
+              </a:rPr>
+              <a:t>Prof. Marcelo Bernardes</a:t>
+            </a:r>
+            <a:endParaRPr lang="pt-BR" b="1" dirty="0">
+              <a:solidFill>
+                <a:schemeClr val="tx1">
+                  <a:lumMod val="85000"/>
+                  <a:lumOff val="15000"/>
+                </a:schemeClr>
+              </a:solidFill>
+              <a:latin typeface="Verdana" panose="020B0604030504040204" pitchFamily="34" charset="0"/>
+              <a:ea typeface="Verdana" panose="020B0604030504040204" pitchFamily="34" charset="0"/>
+              <a:cs typeface="Calibri" panose="020F0502020204030204" pitchFamily="34" charset="0"/>
             </a:endParaRPr>
           </a:p>
         </p:txBody>
@@ -18421,6 +18535,63 @@
           </a:p>
         </p:txBody>
       </p:sp>
+      <p:sp>
+        <p:nvSpPr>
+          <p:cNvPr id="5" name="CaixaDeTexto 4">
+            <a:extLst>
+              <a:ext uri="{FF2B5EF4-FFF2-40B4-BE49-F238E27FC236}">
+                <a16:creationId xmlns:a16="http://schemas.microsoft.com/office/drawing/2014/main" id="{3714BF30-FFEF-4607-8B60-1C5A3DB76602}"/>
+              </a:ext>
+            </a:extLst>
+          </p:cNvPr>
+          <p:cNvSpPr txBox="1"/>
+          <p:nvPr/>
+        </p:nvSpPr>
+        <p:spPr>
+          <a:xfrm>
+            <a:off x="6534462" y="6392903"/>
+            <a:ext cx="2356320" cy="307777"/>
+          </a:xfrm>
+          <a:prstGeom prst="rect">
+            <a:avLst/>
+          </a:prstGeom>
+          <a:noFill/>
+        </p:spPr>
+        <p:txBody>
+          <a:bodyPr wrap="square" rtlCol="0">
+            <a:spAutoFit/>
+          </a:bodyPr>
+          <a:lstStyle/>
+          <a:p>
+            <a:pPr algn="just"/>
+            <a:r>
+              <a:rPr lang="pt-BR" dirty="0">
+                <a:solidFill>
+                  <a:schemeClr val="tx1">
+                    <a:lumMod val="85000"/>
+                    <a:lumOff val="15000"/>
+                  </a:schemeClr>
+                </a:solidFill>
+                <a:latin typeface="Verdana" panose="020B0604030504040204" pitchFamily="34" charset="0"/>
+                <a:ea typeface="Verdana" panose="020B0604030504040204" pitchFamily="34" charset="0"/>
+                <a:cs typeface="Calibri" panose="020F0502020204030204" pitchFamily="34" charset="0"/>
+              </a:rPr>
+              <a:t>Prof. Marcelo Bernardes</a:t>
+            </a:r>
+            <a:endParaRPr lang="pt-BR" b="1" dirty="0">
+              <a:solidFill>
+                <a:schemeClr val="tx1">
+                  <a:lumMod val="85000"/>
+                  <a:lumOff val="15000"/>
+                </a:schemeClr>
+              </a:solidFill>
+              <a:latin typeface="Verdana" panose="020B0604030504040204" pitchFamily="34" charset="0"/>
+              <a:ea typeface="Verdana" panose="020B0604030504040204" pitchFamily="34" charset="0"/>
+              <a:cs typeface="Calibri" panose="020F0502020204030204" pitchFamily="34" charset="0"/>
+            </a:endParaRPr>
+          </a:p>
+        </p:txBody>
+      </p:sp>
     </p:spTree>
   </p:cSld>
   <p:clrMapOvr>
@@ -18508,6 +18679,63 @@
               <a:ea typeface="Verdana"/>
               <a:cs typeface="Verdana"/>
               <a:sym typeface="Verdana"/>
+            </a:endParaRPr>
+          </a:p>
+        </p:txBody>
+      </p:sp>
+      <p:sp>
+        <p:nvSpPr>
+          <p:cNvPr id="3" name="CaixaDeTexto 2">
+            <a:extLst>
+              <a:ext uri="{FF2B5EF4-FFF2-40B4-BE49-F238E27FC236}">
+                <a16:creationId xmlns:a16="http://schemas.microsoft.com/office/drawing/2014/main" id="{7871ACFE-60E7-4B2C-B0E2-4ACDFC1FB878}"/>
+              </a:ext>
+            </a:extLst>
+          </p:cNvPr>
+          <p:cNvSpPr txBox="1"/>
+          <p:nvPr/>
+        </p:nvSpPr>
+        <p:spPr>
+          <a:xfrm>
+            <a:off x="6534462" y="6392903"/>
+            <a:ext cx="2356320" cy="307777"/>
+          </a:xfrm>
+          <a:prstGeom prst="rect">
+            <a:avLst/>
+          </a:prstGeom>
+          <a:noFill/>
+        </p:spPr>
+        <p:txBody>
+          <a:bodyPr wrap="square" rtlCol="0">
+            <a:spAutoFit/>
+          </a:bodyPr>
+          <a:lstStyle/>
+          <a:p>
+            <a:pPr algn="just"/>
+            <a:r>
+              <a:rPr lang="pt-BR" dirty="0">
+                <a:solidFill>
+                  <a:schemeClr val="tx1">
+                    <a:lumMod val="85000"/>
+                    <a:lumOff val="15000"/>
+                  </a:schemeClr>
+                </a:solidFill>
+                <a:latin typeface="Verdana" panose="020B0604030504040204" pitchFamily="34" charset="0"/>
+                <a:ea typeface="Verdana" panose="020B0604030504040204" pitchFamily="34" charset="0"/>
+                <a:cs typeface="Calibri" panose="020F0502020204030204" pitchFamily="34" charset="0"/>
+              </a:rPr>
+              <a:t>Prof. Marcelo Bernardes</a:t>
+            </a:r>
+            <a:endParaRPr lang="pt-BR" b="1" dirty="0">
+              <a:solidFill>
+                <a:schemeClr val="tx1">
+                  <a:lumMod val="85000"/>
+                  <a:lumOff val="15000"/>
+                </a:schemeClr>
+              </a:solidFill>
+              <a:latin typeface="Verdana" panose="020B0604030504040204" pitchFamily="34" charset="0"/>
+              <a:ea typeface="Verdana" panose="020B0604030504040204" pitchFamily="34" charset="0"/>
+              <a:cs typeface="Calibri" panose="020F0502020204030204" pitchFamily="34" charset="0"/>
             </a:endParaRPr>
           </a:p>
         </p:txBody>
@@ -18807,6 +19035,63 @@
           </a:p>
         </p:txBody>
       </p:sp>
+      <p:sp>
+        <p:nvSpPr>
+          <p:cNvPr id="5" name="CaixaDeTexto 4">
+            <a:extLst>
+              <a:ext uri="{FF2B5EF4-FFF2-40B4-BE49-F238E27FC236}">
+                <a16:creationId xmlns:a16="http://schemas.microsoft.com/office/drawing/2014/main" id="{31AE89CC-39CC-4F73-B1A9-EC52F47398F7}"/>
+              </a:ext>
+            </a:extLst>
+          </p:cNvPr>
+          <p:cNvSpPr txBox="1"/>
+          <p:nvPr/>
+        </p:nvSpPr>
+        <p:spPr>
+          <a:xfrm>
+            <a:off x="6534462" y="6392903"/>
+            <a:ext cx="2356320" cy="307777"/>
+          </a:xfrm>
+          <a:prstGeom prst="rect">
+            <a:avLst/>
+          </a:prstGeom>
+          <a:noFill/>
+        </p:spPr>
+        <p:txBody>
+          <a:bodyPr wrap="square" rtlCol="0">
+            <a:spAutoFit/>
+          </a:bodyPr>
+          <a:lstStyle/>
+          <a:p>
+            <a:pPr algn="just"/>
+            <a:r>
+              <a:rPr lang="pt-BR" dirty="0">
+                <a:solidFill>
+                  <a:schemeClr val="tx1">
+                    <a:lumMod val="85000"/>
+                    <a:lumOff val="15000"/>
+                  </a:schemeClr>
+                </a:solidFill>
+                <a:latin typeface="Verdana" panose="020B0604030504040204" pitchFamily="34" charset="0"/>
+                <a:ea typeface="Verdana" panose="020B0604030504040204" pitchFamily="34" charset="0"/>
+                <a:cs typeface="Calibri" panose="020F0502020204030204" pitchFamily="34" charset="0"/>
+              </a:rPr>
+              <a:t>Prof. Marcelo Bernardes</a:t>
+            </a:r>
+            <a:endParaRPr lang="pt-BR" b="1" dirty="0">
+              <a:solidFill>
+                <a:schemeClr val="tx1">
+                  <a:lumMod val="85000"/>
+                  <a:lumOff val="15000"/>
+                </a:schemeClr>
+              </a:solidFill>
+              <a:latin typeface="Verdana" panose="020B0604030504040204" pitchFamily="34" charset="0"/>
+              <a:ea typeface="Verdana" panose="020B0604030504040204" pitchFamily="34" charset="0"/>
+              <a:cs typeface="Calibri" panose="020F0502020204030204" pitchFamily="34" charset="0"/>
+            </a:endParaRPr>
+          </a:p>
+        </p:txBody>
+      </p:sp>
     </p:spTree>
   </p:cSld>
   <p:clrMapOvr>
@@ -19016,6 +19301,63 @@
               <a:ea typeface="Verdana"/>
               <a:cs typeface="Verdana"/>
               <a:sym typeface="Verdana"/>
+            </a:endParaRPr>
+          </a:p>
+        </p:txBody>
+      </p:sp>
+      <p:sp>
+        <p:nvSpPr>
+          <p:cNvPr id="4" name="CaixaDeTexto 3">
+            <a:extLst>
+              <a:ext uri="{FF2B5EF4-FFF2-40B4-BE49-F238E27FC236}">
+                <a16:creationId xmlns:a16="http://schemas.microsoft.com/office/drawing/2014/main" id="{7921566F-7EC9-4CD5-B860-AB975897125B}"/>
+              </a:ext>
+            </a:extLst>
+          </p:cNvPr>
+          <p:cNvSpPr txBox="1"/>
+          <p:nvPr/>
+        </p:nvSpPr>
+        <p:spPr>
+          <a:xfrm>
+            <a:off x="6534462" y="6392903"/>
+            <a:ext cx="2356320" cy="307777"/>
+          </a:xfrm>
+          <a:prstGeom prst="rect">
+            <a:avLst/>
+          </a:prstGeom>
+          <a:noFill/>
+        </p:spPr>
+        <p:txBody>
+          <a:bodyPr wrap="square" rtlCol="0">
+            <a:spAutoFit/>
+          </a:bodyPr>
+          <a:lstStyle/>
+          <a:p>
+            <a:pPr algn="just"/>
+            <a:r>
+              <a:rPr lang="pt-BR" dirty="0">
+                <a:solidFill>
+                  <a:schemeClr val="tx1">
+                    <a:lumMod val="85000"/>
+                    <a:lumOff val="15000"/>
+                  </a:schemeClr>
+                </a:solidFill>
+                <a:latin typeface="Verdana" panose="020B0604030504040204" pitchFamily="34" charset="0"/>
+                <a:ea typeface="Verdana" panose="020B0604030504040204" pitchFamily="34" charset="0"/>
+                <a:cs typeface="Calibri" panose="020F0502020204030204" pitchFamily="34" charset="0"/>
+              </a:rPr>
+              <a:t>Prof. Marcelo Bernardes</a:t>
+            </a:r>
+            <a:endParaRPr lang="pt-BR" b="1" dirty="0">
+              <a:solidFill>
+                <a:schemeClr val="tx1">
+                  <a:lumMod val="85000"/>
+                  <a:lumOff val="15000"/>
+                </a:schemeClr>
+              </a:solidFill>
+              <a:latin typeface="Verdana" panose="020B0604030504040204" pitchFamily="34" charset="0"/>
+              <a:ea typeface="Verdana" panose="020B0604030504040204" pitchFamily="34" charset="0"/>
+              <a:cs typeface="Calibri" panose="020F0502020204030204" pitchFamily="34" charset="0"/>
             </a:endParaRPr>
           </a:p>
         </p:txBody>
@@ -19081,6 +19423,63 @@
           </a:ln>
         </p:spPr>
       </p:pic>
+      <p:sp>
+        <p:nvSpPr>
+          <p:cNvPr id="3" name="CaixaDeTexto 2">
+            <a:extLst>
+              <a:ext uri="{FF2B5EF4-FFF2-40B4-BE49-F238E27FC236}">
+                <a16:creationId xmlns:a16="http://schemas.microsoft.com/office/drawing/2014/main" id="{5B7C83C9-314E-402A-9DE1-4B79E74D8957}"/>
+              </a:ext>
+            </a:extLst>
+          </p:cNvPr>
+          <p:cNvSpPr txBox="1"/>
+          <p:nvPr/>
+        </p:nvSpPr>
+        <p:spPr>
+          <a:xfrm>
+            <a:off x="6534462" y="6392903"/>
+            <a:ext cx="2356320" cy="307777"/>
+          </a:xfrm>
+          <a:prstGeom prst="rect">
+            <a:avLst/>
+          </a:prstGeom>
+          <a:noFill/>
+        </p:spPr>
+        <p:txBody>
+          <a:bodyPr wrap="square" rtlCol="0">
+            <a:spAutoFit/>
+          </a:bodyPr>
+          <a:lstStyle/>
+          <a:p>
+            <a:pPr algn="just"/>
+            <a:r>
+              <a:rPr lang="pt-BR" dirty="0">
+                <a:solidFill>
+                  <a:schemeClr val="tx1">
+                    <a:lumMod val="85000"/>
+                    <a:lumOff val="15000"/>
+                  </a:schemeClr>
+                </a:solidFill>
+                <a:latin typeface="Verdana" panose="020B0604030504040204" pitchFamily="34" charset="0"/>
+                <a:ea typeface="Verdana" panose="020B0604030504040204" pitchFamily="34" charset="0"/>
+                <a:cs typeface="Calibri" panose="020F0502020204030204" pitchFamily="34" charset="0"/>
+              </a:rPr>
+              <a:t>Prof. Marcelo Bernardes</a:t>
+            </a:r>
+            <a:endParaRPr lang="pt-BR" b="1" dirty="0">
+              <a:solidFill>
+                <a:schemeClr val="tx1">
+                  <a:lumMod val="85000"/>
+                  <a:lumOff val="15000"/>
+                </a:schemeClr>
+              </a:solidFill>
+              <a:latin typeface="Verdana" panose="020B0604030504040204" pitchFamily="34" charset="0"/>
+              <a:ea typeface="Verdana" panose="020B0604030504040204" pitchFamily="34" charset="0"/>
+              <a:cs typeface="Calibri" panose="020F0502020204030204" pitchFamily="34" charset="0"/>
+            </a:endParaRPr>
+          </a:p>
+        </p:txBody>
+      </p:sp>
     </p:spTree>
   </p:cSld>
   <p:clrMapOvr>
@@ -19510,6 +19909,63 @@
               <a:ea typeface="Verdana"/>
               <a:cs typeface="Verdana"/>
               <a:sym typeface="Verdana"/>
+            </a:endParaRPr>
+          </a:p>
+        </p:txBody>
+      </p:sp>
+      <p:sp>
+        <p:nvSpPr>
+          <p:cNvPr id="4" name="CaixaDeTexto 3">
+            <a:extLst>
+              <a:ext uri="{FF2B5EF4-FFF2-40B4-BE49-F238E27FC236}">
+                <a16:creationId xmlns:a16="http://schemas.microsoft.com/office/drawing/2014/main" id="{D8CFFFC2-A916-41D1-A3F0-1DBD94DCE478}"/>
+              </a:ext>
+            </a:extLst>
+          </p:cNvPr>
+          <p:cNvSpPr txBox="1"/>
+          <p:nvPr/>
+        </p:nvSpPr>
+        <p:spPr>
+          <a:xfrm>
+            <a:off x="6534462" y="6392903"/>
+            <a:ext cx="2356320" cy="307777"/>
+          </a:xfrm>
+          <a:prstGeom prst="rect">
+            <a:avLst/>
+          </a:prstGeom>
+          <a:noFill/>
+        </p:spPr>
+        <p:txBody>
+          <a:bodyPr wrap="square" rtlCol="0">
+            <a:spAutoFit/>
+          </a:bodyPr>
+          <a:lstStyle/>
+          <a:p>
+            <a:pPr algn="just"/>
+            <a:r>
+              <a:rPr lang="pt-BR" dirty="0">
+                <a:solidFill>
+                  <a:schemeClr val="tx1">
+                    <a:lumMod val="85000"/>
+                    <a:lumOff val="15000"/>
+                  </a:schemeClr>
+                </a:solidFill>
+                <a:latin typeface="Verdana" panose="020B0604030504040204" pitchFamily="34" charset="0"/>
+                <a:ea typeface="Verdana" panose="020B0604030504040204" pitchFamily="34" charset="0"/>
+                <a:cs typeface="Calibri" panose="020F0502020204030204" pitchFamily="34" charset="0"/>
+              </a:rPr>
+              <a:t>Prof. Marcelo Bernardes</a:t>
+            </a:r>
+            <a:endParaRPr lang="pt-BR" b="1" dirty="0">
+              <a:solidFill>
+                <a:schemeClr val="tx1">
+                  <a:lumMod val="85000"/>
+                  <a:lumOff val="15000"/>
+                </a:schemeClr>
+              </a:solidFill>
+              <a:latin typeface="Verdana" panose="020B0604030504040204" pitchFamily="34" charset="0"/>
+              <a:ea typeface="Verdana" panose="020B0604030504040204" pitchFamily="34" charset="0"/>
+              <a:cs typeface="Calibri" panose="020F0502020204030204" pitchFamily="34" charset="0"/>
             </a:endParaRPr>
           </a:p>
         </p:txBody>
@@ -19871,6 +20327,63 @@
           </a:p>
         </p:txBody>
       </p:sp>
+      <p:sp>
+        <p:nvSpPr>
+          <p:cNvPr id="4" name="CaixaDeTexto 3">
+            <a:extLst>
+              <a:ext uri="{FF2B5EF4-FFF2-40B4-BE49-F238E27FC236}">
+                <a16:creationId xmlns:a16="http://schemas.microsoft.com/office/drawing/2014/main" id="{B525B730-FED1-4EEF-A9A4-F6E530886504}"/>
+              </a:ext>
+            </a:extLst>
+          </p:cNvPr>
+          <p:cNvSpPr txBox="1"/>
+          <p:nvPr/>
+        </p:nvSpPr>
+        <p:spPr>
+          <a:xfrm>
+            <a:off x="6534462" y="6392903"/>
+            <a:ext cx="2356320" cy="307777"/>
+          </a:xfrm>
+          <a:prstGeom prst="rect">
+            <a:avLst/>
+          </a:prstGeom>
+          <a:noFill/>
+        </p:spPr>
+        <p:txBody>
+          <a:bodyPr wrap="square" rtlCol="0">
+            <a:spAutoFit/>
+          </a:bodyPr>
+          <a:lstStyle/>
+          <a:p>
+            <a:pPr algn="just"/>
+            <a:r>
+              <a:rPr lang="pt-BR" dirty="0">
+                <a:solidFill>
+                  <a:schemeClr val="tx1">
+                    <a:lumMod val="85000"/>
+                    <a:lumOff val="15000"/>
+                  </a:schemeClr>
+                </a:solidFill>
+                <a:latin typeface="Verdana" panose="020B0604030504040204" pitchFamily="34" charset="0"/>
+                <a:ea typeface="Verdana" panose="020B0604030504040204" pitchFamily="34" charset="0"/>
+                <a:cs typeface="Calibri" panose="020F0502020204030204" pitchFamily="34" charset="0"/>
+              </a:rPr>
+              <a:t>Prof. Marcelo Bernardes</a:t>
+            </a:r>
+            <a:endParaRPr lang="pt-BR" b="1" dirty="0">
+              <a:solidFill>
+                <a:schemeClr val="tx1">
+                  <a:lumMod val="85000"/>
+                  <a:lumOff val="15000"/>
+                </a:schemeClr>
+              </a:solidFill>
+              <a:latin typeface="Verdana" panose="020B0604030504040204" pitchFamily="34" charset="0"/>
+              <a:ea typeface="Verdana" panose="020B0604030504040204" pitchFamily="34" charset="0"/>
+              <a:cs typeface="Calibri" panose="020F0502020204030204" pitchFamily="34" charset="0"/>
+            </a:endParaRPr>
+          </a:p>
+        </p:txBody>
+      </p:sp>
     </p:spTree>
   </p:cSld>
   <p:clrMapOvr>
@@ -20390,6 +20903,63 @@
               <a:ea typeface="Verdana"/>
               <a:cs typeface="Verdana"/>
               <a:sym typeface="Verdana"/>
+            </a:endParaRPr>
+          </a:p>
+        </p:txBody>
+      </p:sp>
+      <p:sp>
+        <p:nvSpPr>
+          <p:cNvPr id="4" name="CaixaDeTexto 3">
+            <a:extLst>
+              <a:ext uri="{FF2B5EF4-FFF2-40B4-BE49-F238E27FC236}">
+                <a16:creationId xmlns:a16="http://schemas.microsoft.com/office/drawing/2014/main" id="{3AB558C0-58EE-41BB-A4E4-AAADFE04AD7C}"/>
+              </a:ext>
+            </a:extLst>
+          </p:cNvPr>
+          <p:cNvSpPr txBox="1"/>
+          <p:nvPr/>
+        </p:nvSpPr>
+        <p:spPr>
+          <a:xfrm>
+            <a:off x="6534462" y="6392903"/>
+            <a:ext cx="2356320" cy="307777"/>
+          </a:xfrm>
+          <a:prstGeom prst="rect">
+            <a:avLst/>
+          </a:prstGeom>
+          <a:noFill/>
+        </p:spPr>
+        <p:txBody>
+          <a:bodyPr wrap="square" rtlCol="0">
+            <a:spAutoFit/>
+          </a:bodyPr>
+          <a:lstStyle/>
+          <a:p>
+            <a:pPr algn="just"/>
+            <a:r>
+              <a:rPr lang="pt-BR" dirty="0">
+                <a:solidFill>
+                  <a:schemeClr val="tx1">
+                    <a:lumMod val="85000"/>
+                    <a:lumOff val="15000"/>
+                  </a:schemeClr>
+                </a:solidFill>
+                <a:latin typeface="Verdana" panose="020B0604030504040204" pitchFamily="34" charset="0"/>
+                <a:ea typeface="Verdana" panose="020B0604030504040204" pitchFamily="34" charset="0"/>
+                <a:cs typeface="Calibri" panose="020F0502020204030204" pitchFamily="34" charset="0"/>
+              </a:rPr>
+              <a:t>Prof. Marcelo Bernardes</a:t>
+            </a:r>
+            <a:endParaRPr lang="pt-BR" b="1" dirty="0">
+              <a:solidFill>
+                <a:schemeClr val="tx1">
+                  <a:lumMod val="85000"/>
+                  <a:lumOff val="15000"/>
+                </a:schemeClr>
+              </a:solidFill>
+              <a:latin typeface="Verdana" panose="020B0604030504040204" pitchFamily="34" charset="0"/>
+              <a:ea typeface="Verdana" panose="020B0604030504040204" pitchFamily="34" charset="0"/>
+              <a:cs typeface="Calibri" panose="020F0502020204030204" pitchFamily="34" charset="0"/>
             </a:endParaRPr>
           </a:p>
         </p:txBody>
@@ -20455,6 +21025,57 @@
           </a:ln>
         </p:spPr>
       </p:pic>
+      <p:sp>
+        <p:nvSpPr>
+          <p:cNvPr id="4" name="CaixaDeTexto 3">
+            <a:extLst>
+              <a:ext uri="{FF2B5EF4-FFF2-40B4-BE49-F238E27FC236}">
+                <a16:creationId xmlns:a16="http://schemas.microsoft.com/office/drawing/2014/main" id="{F50B4E1B-825B-4B4C-9BE5-B85D2ABB7CB4}"/>
+              </a:ext>
+            </a:extLst>
+          </p:cNvPr>
+          <p:cNvSpPr txBox="1"/>
+          <p:nvPr/>
+        </p:nvSpPr>
+        <p:spPr>
+          <a:xfrm>
+            <a:off x="6534462" y="6392903"/>
+            <a:ext cx="2356320" cy="307777"/>
+          </a:xfrm>
+          <a:prstGeom prst="rect">
+            <a:avLst/>
+          </a:prstGeom>
+          <a:noFill/>
+        </p:spPr>
+        <p:txBody>
+          <a:bodyPr wrap="square" rtlCol="0">
+            <a:spAutoFit/>
+          </a:bodyPr>
+          <a:lstStyle/>
+          <a:p>
+            <a:pPr algn="just"/>
+            <a:r>
+              <a:rPr lang="pt-BR" dirty="0">
+                <a:solidFill>
+                  <a:schemeClr val="bg1"/>
+                </a:solidFill>
+                <a:latin typeface="Verdana" panose="020B0604030504040204" pitchFamily="34" charset="0"/>
+                <a:ea typeface="Verdana" panose="020B0604030504040204" pitchFamily="34" charset="0"/>
+                <a:cs typeface="Calibri" panose="020F0502020204030204" pitchFamily="34" charset="0"/>
+              </a:rPr>
+              <a:t>Prof. Marcelo Bernardes</a:t>
+            </a:r>
+            <a:endParaRPr lang="pt-BR" b="1" dirty="0">
+              <a:solidFill>
+                <a:schemeClr val="bg1"/>
+              </a:solidFill>
+              <a:latin typeface="Verdana" panose="020B0604030504040204" pitchFamily="34" charset="0"/>
+              <a:ea typeface="Verdana" panose="020B0604030504040204" pitchFamily="34" charset="0"/>
+              <a:cs typeface="Calibri" panose="020F0502020204030204" pitchFamily="34" charset="0"/>
+            </a:endParaRPr>
+          </a:p>
+        </p:txBody>
+      </p:sp>
     </p:spTree>
   </p:cSld>
   <p:clrMapOvr>
@@ -20516,6 +21137,63 @@
           </a:ln>
         </p:spPr>
       </p:pic>
+      <p:sp>
+        <p:nvSpPr>
+          <p:cNvPr id="3" name="CaixaDeTexto 2">
+            <a:extLst>
+              <a:ext uri="{FF2B5EF4-FFF2-40B4-BE49-F238E27FC236}">
+                <a16:creationId xmlns:a16="http://schemas.microsoft.com/office/drawing/2014/main" id="{B0036024-A37B-46D9-A345-67D8D1DB4EF8}"/>
+              </a:ext>
+            </a:extLst>
+          </p:cNvPr>
+          <p:cNvSpPr txBox="1"/>
+          <p:nvPr/>
+        </p:nvSpPr>
+        <p:spPr>
+          <a:xfrm>
+            <a:off x="6534462" y="6392903"/>
+            <a:ext cx="2356320" cy="307777"/>
+          </a:xfrm>
+          <a:prstGeom prst="rect">
+            <a:avLst/>
+          </a:prstGeom>
+          <a:noFill/>
+        </p:spPr>
+        <p:txBody>
+          <a:bodyPr wrap="square" rtlCol="0">
+            <a:spAutoFit/>
+          </a:bodyPr>
+          <a:lstStyle/>
+          <a:p>
+            <a:pPr algn="just"/>
+            <a:r>
+              <a:rPr lang="pt-BR" dirty="0">
+                <a:solidFill>
+                  <a:schemeClr val="tx1">
+                    <a:lumMod val="85000"/>
+                    <a:lumOff val="15000"/>
+                  </a:schemeClr>
+                </a:solidFill>
+                <a:latin typeface="Verdana" panose="020B0604030504040204" pitchFamily="34" charset="0"/>
+                <a:ea typeface="Verdana" panose="020B0604030504040204" pitchFamily="34" charset="0"/>
+                <a:cs typeface="Calibri" panose="020F0502020204030204" pitchFamily="34" charset="0"/>
+              </a:rPr>
+              <a:t>Prof. Marcelo Bernardes</a:t>
+            </a:r>
+            <a:endParaRPr lang="pt-BR" b="1" dirty="0">
+              <a:solidFill>
+                <a:schemeClr val="tx1">
+                  <a:lumMod val="85000"/>
+                  <a:lumOff val="15000"/>
+                </a:schemeClr>
+              </a:solidFill>
+              <a:latin typeface="Verdana" panose="020B0604030504040204" pitchFamily="34" charset="0"/>
+              <a:ea typeface="Verdana" panose="020B0604030504040204" pitchFamily="34" charset="0"/>
+              <a:cs typeface="Calibri" panose="020F0502020204030204" pitchFamily="34" charset="0"/>
+            </a:endParaRPr>
+          </a:p>
+        </p:txBody>
+      </p:sp>
     </p:spTree>
   </p:cSld>
   <p:clrMapOvr>
@@ -20577,6 +21255,63 @@
           </a:ln>
         </p:spPr>
       </p:pic>
+      <p:sp>
+        <p:nvSpPr>
+          <p:cNvPr id="3" name="CaixaDeTexto 2">
+            <a:extLst>
+              <a:ext uri="{FF2B5EF4-FFF2-40B4-BE49-F238E27FC236}">
+                <a16:creationId xmlns:a16="http://schemas.microsoft.com/office/drawing/2014/main" id="{3C52972E-BCD3-46AB-98E6-113E4F43574B}"/>
+              </a:ext>
+            </a:extLst>
+          </p:cNvPr>
+          <p:cNvSpPr txBox="1"/>
+          <p:nvPr/>
+        </p:nvSpPr>
+        <p:spPr>
+          <a:xfrm>
+            <a:off x="6534462" y="6392903"/>
+            <a:ext cx="2356320" cy="307777"/>
+          </a:xfrm>
+          <a:prstGeom prst="rect">
+            <a:avLst/>
+          </a:prstGeom>
+          <a:noFill/>
+        </p:spPr>
+        <p:txBody>
+          <a:bodyPr wrap="square" rtlCol="0">
+            <a:spAutoFit/>
+          </a:bodyPr>
+          <a:lstStyle/>
+          <a:p>
+            <a:pPr algn="just"/>
+            <a:r>
+              <a:rPr lang="pt-BR" dirty="0">
+                <a:solidFill>
+                  <a:schemeClr val="tx1">
+                    <a:lumMod val="85000"/>
+                    <a:lumOff val="15000"/>
+                  </a:schemeClr>
+                </a:solidFill>
+                <a:latin typeface="Verdana" panose="020B0604030504040204" pitchFamily="34" charset="0"/>
+                <a:ea typeface="Verdana" panose="020B0604030504040204" pitchFamily="34" charset="0"/>
+                <a:cs typeface="Calibri" panose="020F0502020204030204" pitchFamily="34" charset="0"/>
+              </a:rPr>
+              <a:t>Prof. Marcelo Bernardes</a:t>
+            </a:r>
+            <a:endParaRPr lang="pt-BR" b="1" dirty="0">
+              <a:solidFill>
+                <a:schemeClr val="tx1">
+                  <a:lumMod val="85000"/>
+                  <a:lumOff val="15000"/>
+                </a:schemeClr>
+              </a:solidFill>
+              <a:latin typeface="Verdana" panose="020B0604030504040204" pitchFamily="34" charset="0"/>
+              <a:ea typeface="Verdana" panose="020B0604030504040204" pitchFamily="34" charset="0"/>
+              <a:cs typeface="Calibri" panose="020F0502020204030204" pitchFamily="34" charset="0"/>
+            </a:endParaRPr>
+          </a:p>
+        </p:txBody>
+      </p:sp>
     </p:spTree>
   </p:cSld>
   <p:clrMapOvr>
@@ -20638,6 +21373,63 @@
           </a:ln>
         </p:spPr>
       </p:pic>
+      <p:sp>
+        <p:nvSpPr>
+          <p:cNvPr id="3" name="CaixaDeTexto 2">
+            <a:extLst>
+              <a:ext uri="{FF2B5EF4-FFF2-40B4-BE49-F238E27FC236}">
+                <a16:creationId xmlns:a16="http://schemas.microsoft.com/office/drawing/2014/main" id="{3A657105-4623-45CC-A4EA-1D111C857C45}"/>
+              </a:ext>
+            </a:extLst>
+          </p:cNvPr>
+          <p:cNvSpPr txBox="1"/>
+          <p:nvPr/>
+        </p:nvSpPr>
+        <p:spPr>
+          <a:xfrm>
+            <a:off x="6534462" y="6392903"/>
+            <a:ext cx="2356320" cy="307777"/>
+          </a:xfrm>
+          <a:prstGeom prst="rect">
+            <a:avLst/>
+          </a:prstGeom>
+          <a:noFill/>
+        </p:spPr>
+        <p:txBody>
+          <a:bodyPr wrap="square" rtlCol="0">
+            <a:spAutoFit/>
+          </a:bodyPr>
+          <a:lstStyle/>
+          <a:p>
+            <a:pPr algn="just"/>
+            <a:r>
+              <a:rPr lang="pt-BR" dirty="0">
+                <a:solidFill>
+                  <a:schemeClr val="tx1">
+                    <a:lumMod val="85000"/>
+                    <a:lumOff val="15000"/>
+                  </a:schemeClr>
+                </a:solidFill>
+                <a:latin typeface="Verdana" panose="020B0604030504040204" pitchFamily="34" charset="0"/>
+                <a:ea typeface="Verdana" panose="020B0604030504040204" pitchFamily="34" charset="0"/>
+                <a:cs typeface="Calibri" panose="020F0502020204030204" pitchFamily="34" charset="0"/>
+              </a:rPr>
+              <a:t>Prof. Marcelo Bernardes</a:t>
+            </a:r>
+            <a:endParaRPr lang="pt-BR" b="1" dirty="0">
+              <a:solidFill>
+                <a:schemeClr val="tx1">
+                  <a:lumMod val="85000"/>
+                  <a:lumOff val="15000"/>
+                </a:schemeClr>
+              </a:solidFill>
+              <a:latin typeface="Verdana" panose="020B0604030504040204" pitchFamily="34" charset="0"/>
+              <a:ea typeface="Verdana" panose="020B0604030504040204" pitchFamily="34" charset="0"/>
+              <a:cs typeface="Calibri" panose="020F0502020204030204" pitchFamily="34" charset="0"/>
+            </a:endParaRPr>
+          </a:p>
+        </p:txBody>
+      </p:sp>
     </p:spTree>
   </p:cSld>
   <p:clrMapOvr>
@@ -20699,6 +21491,63 @@
           </a:ln>
         </p:spPr>
       </p:pic>
+      <p:sp>
+        <p:nvSpPr>
+          <p:cNvPr id="3" name="CaixaDeTexto 2">
+            <a:extLst>
+              <a:ext uri="{FF2B5EF4-FFF2-40B4-BE49-F238E27FC236}">
+                <a16:creationId xmlns:a16="http://schemas.microsoft.com/office/drawing/2014/main" id="{F47DA13B-9525-4559-B716-394A04DEC97A}"/>
+              </a:ext>
+            </a:extLst>
+          </p:cNvPr>
+          <p:cNvSpPr txBox="1"/>
+          <p:nvPr/>
+        </p:nvSpPr>
+        <p:spPr>
+          <a:xfrm>
+            <a:off x="6534462" y="6392903"/>
+            <a:ext cx="2356320" cy="307777"/>
+          </a:xfrm>
+          <a:prstGeom prst="rect">
+            <a:avLst/>
+          </a:prstGeom>
+          <a:noFill/>
+        </p:spPr>
+        <p:txBody>
+          <a:bodyPr wrap="square" rtlCol="0">
+            <a:spAutoFit/>
+          </a:bodyPr>
+          <a:lstStyle/>
+          <a:p>
+            <a:pPr algn="just"/>
+            <a:r>
+              <a:rPr lang="pt-BR" dirty="0">
+                <a:solidFill>
+                  <a:schemeClr val="tx1">
+                    <a:lumMod val="85000"/>
+                    <a:lumOff val="15000"/>
+                  </a:schemeClr>
+                </a:solidFill>
+                <a:latin typeface="Verdana" panose="020B0604030504040204" pitchFamily="34" charset="0"/>
+                <a:ea typeface="Verdana" panose="020B0604030504040204" pitchFamily="34" charset="0"/>
+                <a:cs typeface="Calibri" panose="020F0502020204030204" pitchFamily="34" charset="0"/>
+              </a:rPr>
+              <a:t>Prof. Marcelo Bernardes</a:t>
+            </a:r>
+            <a:endParaRPr lang="pt-BR" b="1" dirty="0">
+              <a:solidFill>
+                <a:schemeClr val="tx1">
+                  <a:lumMod val="85000"/>
+                  <a:lumOff val="15000"/>
+                </a:schemeClr>
+              </a:solidFill>
+              <a:latin typeface="Verdana" panose="020B0604030504040204" pitchFamily="34" charset="0"/>
+              <a:ea typeface="Verdana" panose="020B0604030504040204" pitchFamily="34" charset="0"/>
+              <a:cs typeface="Calibri" panose="020F0502020204030204" pitchFamily="34" charset="0"/>
+            </a:endParaRPr>
+          </a:p>
+        </p:txBody>
+      </p:sp>
     </p:spTree>
   </p:cSld>
   <p:clrMapOvr>
@@ -20760,6 +21609,63 @@
           </a:ln>
         </p:spPr>
       </p:pic>
+      <p:sp>
+        <p:nvSpPr>
+          <p:cNvPr id="3" name="CaixaDeTexto 2">
+            <a:extLst>
+              <a:ext uri="{FF2B5EF4-FFF2-40B4-BE49-F238E27FC236}">
+                <a16:creationId xmlns:a16="http://schemas.microsoft.com/office/drawing/2014/main" id="{A452A59D-B131-4E5D-B4B1-E10241826A8F}"/>
+              </a:ext>
+            </a:extLst>
+          </p:cNvPr>
+          <p:cNvSpPr txBox="1"/>
+          <p:nvPr/>
+        </p:nvSpPr>
+        <p:spPr>
+          <a:xfrm>
+            <a:off x="6534462" y="6392903"/>
+            <a:ext cx="2356320" cy="307777"/>
+          </a:xfrm>
+          <a:prstGeom prst="rect">
+            <a:avLst/>
+          </a:prstGeom>
+          <a:noFill/>
+        </p:spPr>
+        <p:txBody>
+          <a:bodyPr wrap="square" rtlCol="0">
+            <a:spAutoFit/>
+          </a:bodyPr>
+          <a:lstStyle/>
+          <a:p>
+            <a:pPr algn="just"/>
+            <a:r>
+              <a:rPr lang="pt-BR" dirty="0">
+                <a:solidFill>
+                  <a:schemeClr val="tx1">
+                    <a:lumMod val="85000"/>
+                    <a:lumOff val="15000"/>
+                  </a:schemeClr>
+                </a:solidFill>
+                <a:latin typeface="Verdana" panose="020B0604030504040204" pitchFamily="34" charset="0"/>
+                <a:ea typeface="Verdana" panose="020B0604030504040204" pitchFamily="34" charset="0"/>
+                <a:cs typeface="Calibri" panose="020F0502020204030204" pitchFamily="34" charset="0"/>
+              </a:rPr>
+              <a:t>Prof. Marcelo Bernardes</a:t>
+            </a:r>
+            <a:endParaRPr lang="pt-BR" b="1" dirty="0">
+              <a:solidFill>
+                <a:schemeClr val="tx1">
+                  <a:lumMod val="85000"/>
+                  <a:lumOff val="15000"/>
+                </a:schemeClr>
+              </a:solidFill>
+              <a:latin typeface="Verdana" panose="020B0604030504040204" pitchFamily="34" charset="0"/>
+              <a:ea typeface="Verdana" panose="020B0604030504040204" pitchFamily="34" charset="0"/>
+              <a:cs typeface="Calibri" panose="020F0502020204030204" pitchFamily="34" charset="0"/>
+            </a:endParaRPr>
+          </a:p>
+        </p:txBody>
+      </p:sp>
     </p:spTree>
   </p:cSld>
   <p:clrMapOvr>
@@ -20907,6 +21813,63 @@
           </a:p>
         </p:txBody>
       </p:sp>
+      <p:sp>
+        <p:nvSpPr>
+          <p:cNvPr id="5" name="CaixaDeTexto 4">
+            <a:extLst>
+              <a:ext uri="{FF2B5EF4-FFF2-40B4-BE49-F238E27FC236}">
+                <a16:creationId xmlns:a16="http://schemas.microsoft.com/office/drawing/2014/main" id="{1D578F49-C347-432D-81DE-4FA9F85854C3}"/>
+              </a:ext>
+            </a:extLst>
+          </p:cNvPr>
+          <p:cNvSpPr txBox="1"/>
+          <p:nvPr/>
+        </p:nvSpPr>
+        <p:spPr>
+          <a:xfrm>
+            <a:off x="6534462" y="6392903"/>
+            <a:ext cx="2356320" cy="307777"/>
+          </a:xfrm>
+          <a:prstGeom prst="rect">
+            <a:avLst/>
+          </a:prstGeom>
+          <a:noFill/>
+        </p:spPr>
+        <p:txBody>
+          <a:bodyPr wrap="square" rtlCol="0">
+            <a:spAutoFit/>
+          </a:bodyPr>
+          <a:lstStyle/>
+          <a:p>
+            <a:pPr algn="just"/>
+            <a:r>
+              <a:rPr lang="pt-BR" dirty="0">
+                <a:solidFill>
+                  <a:schemeClr val="tx1">
+                    <a:lumMod val="85000"/>
+                    <a:lumOff val="15000"/>
+                  </a:schemeClr>
+                </a:solidFill>
+                <a:latin typeface="Verdana" panose="020B0604030504040204" pitchFamily="34" charset="0"/>
+                <a:ea typeface="Verdana" panose="020B0604030504040204" pitchFamily="34" charset="0"/>
+                <a:cs typeface="Calibri" panose="020F0502020204030204" pitchFamily="34" charset="0"/>
+              </a:rPr>
+              <a:t>Prof. Marcelo Bernardes</a:t>
+            </a:r>
+            <a:endParaRPr lang="pt-BR" b="1" dirty="0">
+              <a:solidFill>
+                <a:schemeClr val="tx1">
+                  <a:lumMod val="85000"/>
+                  <a:lumOff val="15000"/>
+                </a:schemeClr>
+              </a:solidFill>
+              <a:latin typeface="Verdana" panose="020B0604030504040204" pitchFamily="34" charset="0"/>
+              <a:ea typeface="Verdana" panose="020B0604030504040204" pitchFamily="34" charset="0"/>
+              <a:cs typeface="Calibri" panose="020F0502020204030204" pitchFamily="34" charset="0"/>
+            </a:endParaRPr>
+          </a:p>
+        </p:txBody>
+      </p:sp>
     </p:spTree>
   </p:cSld>
   <p:clrMapOvr>
@@ -20994,6 +21957,57 @@
               <a:ea typeface="Verdana"/>
               <a:cs typeface="Verdana"/>
               <a:sym typeface="Verdana"/>
+            </a:endParaRPr>
+          </a:p>
+        </p:txBody>
+      </p:sp>
+      <p:sp>
+        <p:nvSpPr>
+          <p:cNvPr id="3" name="CaixaDeTexto 2">
+            <a:extLst>
+              <a:ext uri="{FF2B5EF4-FFF2-40B4-BE49-F238E27FC236}">
+                <a16:creationId xmlns:a16="http://schemas.microsoft.com/office/drawing/2014/main" id="{9BDEA6B0-A182-40CE-BC6D-163A48062398}"/>
+              </a:ext>
+            </a:extLst>
+          </p:cNvPr>
+          <p:cNvSpPr txBox="1"/>
+          <p:nvPr/>
+        </p:nvSpPr>
+        <p:spPr>
+          <a:xfrm>
+            <a:off x="6534462" y="6392903"/>
+            <a:ext cx="2356320" cy="307777"/>
+          </a:xfrm>
+          <a:prstGeom prst="rect">
+            <a:avLst/>
+          </a:prstGeom>
+          <a:noFill/>
+        </p:spPr>
+        <p:txBody>
+          <a:bodyPr wrap="square" rtlCol="0">
+            <a:spAutoFit/>
+          </a:bodyPr>
+          <a:lstStyle/>
+          <a:p>
+            <a:pPr algn="just"/>
+            <a:r>
+              <a:rPr lang="pt-BR" dirty="0">
+                <a:solidFill>
+                  <a:schemeClr val="bg1"/>
+                </a:solidFill>
+                <a:latin typeface="Verdana" panose="020B0604030504040204" pitchFamily="34" charset="0"/>
+                <a:ea typeface="Verdana" panose="020B0604030504040204" pitchFamily="34" charset="0"/>
+                <a:cs typeface="Calibri" panose="020F0502020204030204" pitchFamily="34" charset="0"/>
+              </a:rPr>
+              <a:t>Prof. Marcelo Bernardes</a:t>
+            </a:r>
+            <a:endParaRPr lang="pt-BR" b="1" dirty="0">
+              <a:solidFill>
+                <a:schemeClr val="bg1"/>
+              </a:solidFill>
+              <a:latin typeface="Verdana" panose="020B0604030504040204" pitchFamily="34" charset="0"/>
+              <a:ea typeface="Verdana" panose="020B0604030504040204" pitchFamily="34" charset="0"/>
+              <a:cs typeface="Calibri" panose="020F0502020204030204" pitchFamily="34" charset="0"/>
             </a:endParaRPr>
           </a:p>
         </p:txBody>
@@ -21225,6 +22239,57 @@
           </a:p>
         </p:txBody>
       </p:sp>
+      <p:sp>
+        <p:nvSpPr>
+          <p:cNvPr id="4" name="CaixaDeTexto 3">
+            <a:extLst>
+              <a:ext uri="{FF2B5EF4-FFF2-40B4-BE49-F238E27FC236}">
+                <a16:creationId xmlns:a16="http://schemas.microsoft.com/office/drawing/2014/main" id="{6DA01B78-0089-4420-AFA4-06CA9F04CCF7}"/>
+              </a:ext>
+            </a:extLst>
+          </p:cNvPr>
+          <p:cNvSpPr txBox="1"/>
+          <p:nvPr/>
+        </p:nvSpPr>
+        <p:spPr>
+          <a:xfrm>
+            <a:off x="6534462" y="6392903"/>
+            <a:ext cx="2356320" cy="307777"/>
+          </a:xfrm>
+          <a:prstGeom prst="rect">
+            <a:avLst/>
+          </a:prstGeom>
+          <a:noFill/>
+        </p:spPr>
+        <p:txBody>
+          <a:bodyPr wrap="square" rtlCol="0">
+            <a:spAutoFit/>
+          </a:bodyPr>
+          <a:lstStyle/>
+          <a:p>
+            <a:pPr algn="just"/>
+            <a:r>
+              <a:rPr lang="pt-BR" dirty="0">
+                <a:solidFill>
+                  <a:schemeClr val="bg1"/>
+                </a:solidFill>
+                <a:latin typeface="Verdana" panose="020B0604030504040204" pitchFamily="34" charset="0"/>
+                <a:ea typeface="Verdana" panose="020B0604030504040204" pitchFamily="34" charset="0"/>
+                <a:cs typeface="Calibri" panose="020F0502020204030204" pitchFamily="34" charset="0"/>
+              </a:rPr>
+              <a:t>Prof. Marcelo Bernardes</a:t>
+            </a:r>
+            <a:endParaRPr lang="pt-BR" b="1" dirty="0">
+              <a:solidFill>
+                <a:schemeClr val="bg1"/>
+              </a:solidFill>
+              <a:latin typeface="Verdana" panose="020B0604030504040204" pitchFamily="34" charset="0"/>
+              <a:ea typeface="Verdana" panose="020B0604030504040204" pitchFamily="34" charset="0"/>
+              <a:cs typeface="Calibri" panose="020F0502020204030204" pitchFamily="34" charset="0"/>
+            </a:endParaRPr>
+          </a:p>
+        </p:txBody>
+      </p:sp>
     </p:spTree>
   </p:cSld>
   <p:clrMapOvr>
@@ -22740,6 +23805,57 @@
               <a:ea typeface="Verdana"/>
               <a:cs typeface="Verdana"/>
               <a:sym typeface="Verdana"/>
+            </a:endParaRPr>
+          </a:p>
+        </p:txBody>
+      </p:sp>
+      <p:sp>
+        <p:nvSpPr>
+          <p:cNvPr id="3" name="CaixaDeTexto 2">
+            <a:extLst>
+              <a:ext uri="{FF2B5EF4-FFF2-40B4-BE49-F238E27FC236}">
+                <a16:creationId xmlns:a16="http://schemas.microsoft.com/office/drawing/2014/main" id="{FDECE2BF-E64C-4434-9CC8-2B701A7EC458}"/>
+              </a:ext>
+            </a:extLst>
+          </p:cNvPr>
+          <p:cNvSpPr txBox="1"/>
+          <p:nvPr/>
+        </p:nvSpPr>
+        <p:spPr>
+          <a:xfrm>
+            <a:off x="6534462" y="6392903"/>
+            <a:ext cx="2356320" cy="307777"/>
+          </a:xfrm>
+          <a:prstGeom prst="rect">
+            <a:avLst/>
+          </a:prstGeom>
+          <a:noFill/>
+        </p:spPr>
+        <p:txBody>
+          <a:bodyPr wrap="square" rtlCol="0">
+            <a:spAutoFit/>
+          </a:bodyPr>
+          <a:lstStyle/>
+          <a:p>
+            <a:pPr algn="just"/>
+            <a:r>
+              <a:rPr lang="pt-BR" dirty="0">
+                <a:solidFill>
+                  <a:schemeClr val="bg1"/>
+                </a:solidFill>
+                <a:latin typeface="Verdana" panose="020B0604030504040204" pitchFamily="34" charset="0"/>
+                <a:ea typeface="Verdana" panose="020B0604030504040204" pitchFamily="34" charset="0"/>
+                <a:cs typeface="Calibri" panose="020F0502020204030204" pitchFamily="34" charset="0"/>
+              </a:rPr>
+              <a:t>Prof. Marcelo Bernardes</a:t>
+            </a:r>
+            <a:endParaRPr lang="pt-BR" b="1" dirty="0">
+              <a:solidFill>
+                <a:schemeClr val="bg1"/>
+              </a:solidFill>
+              <a:latin typeface="Verdana" panose="020B0604030504040204" pitchFamily="34" charset="0"/>
+              <a:ea typeface="Verdana" panose="020B0604030504040204" pitchFamily="34" charset="0"/>
+              <a:cs typeface="Calibri" panose="020F0502020204030204" pitchFamily="34" charset="0"/>
             </a:endParaRPr>
           </a:p>
         </p:txBody>
@@ -22835,6 +23951,57 @@
           </a:p>
         </p:txBody>
       </p:sp>
+      <p:sp>
+        <p:nvSpPr>
+          <p:cNvPr id="3" name="CaixaDeTexto 2">
+            <a:extLst>
+              <a:ext uri="{FF2B5EF4-FFF2-40B4-BE49-F238E27FC236}">
+                <a16:creationId xmlns:a16="http://schemas.microsoft.com/office/drawing/2014/main" id="{E9BA2528-F681-40E0-A415-0386FFAE2B26}"/>
+              </a:ext>
+            </a:extLst>
+          </p:cNvPr>
+          <p:cNvSpPr txBox="1"/>
+          <p:nvPr/>
+        </p:nvSpPr>
+        <p:spPr>
+          <a:xfrm>
+            <a:off x="6534462" y="6392903"/>
+            <a:ext cx="2356320" cy="307777"/>
+          </a:xfrm>
+          <a:prstGeom prst="rect">
+            <a:avLst/>
+          </a:prstGeom>
+          <a:noFill/>
+        </p:spPr>
+        <p:txBody>
+          <a:bodyPr wrap="square" rtlCol="0">
+            <a:spAutoFit/>
+          </a:bodyPr>
+          <a:lstStyle/>
+          <a:p>
+            <a:pPr algn="just"/>
+            <a:r>
+              <a:rPr lang="pt-BR" dirty="0">
+                <a:solidFill>
+                  <a:schemeClr val="bg1"/>
+                </a:solidFill>
+                <a:latin typeface="Verdana" panose="020B0604030504040204" pitchFamily="34" charset="0"/>
+                <a:ea typeface="Verdana" panose="020B0604030504040204" pitchFamily="34" charset="0"/>
+                <a:cs typeface="Calibri" panose="020F0502020204030204" pitchFamily="34" charset="0"/>
+              </a:rPr>
+              <a:t>Prof. Marcelo Bernardes</a:t>
+            </a:r>
+            <a:endParaRPr lang="pt-BR" b="1" dirty="0">
+              <a:solidFill>
+                <a:schemeClr val="bg1"/>
+              </a:solidFill>
+              <a:latin typeface="Verdana" panose="020B0604030504040204" pitchFamily="34" charset="0"/>
+              <a:ea typeface="Verdana" panose="020B0604030504040204" pitchFamily="34" charset="0"/>
+              <a:cs typeface="Calibri" panose="020F0502020204030204" pitchFamily="34" charset="0"/>
+            </a:endParaRPr>
+          </a:p>
+        </p:txBody>
+      </p:sp>
     </p:spTree>
   </p:cSld>
   <p:clrMapOvr>
@@ -23334,6 +24501,57 @@
               <a:ea typeface="Verdana"/>
               <a:cs typeface="Verdana"/>
               <a:sym typeface="Verdana"/>
+            </a:endParaRPr>
+          </a:p>
+        </p:txBody>
+      </p:sp>
+      <p:sp>
+        <p:nvSpPr>
+          <p:cNvPr id="3" name="CaixaDeTexto 2">
+            <a:extLst>
+              <a:ext uri="{FF2B5EF4-FFF2-40B4-BE49-F238E27FC236}">
+                <a16:creationId xmlns:a16="http://schemas.microsoft.com/office/drawing/2014/main" id="{EE2E2BA3-278F-4EB8-A11B-AE6EA621C781}"/>
+              </a:ext>
+            </a:extLst>
+          </p:cNvPr>
+          <p:cNvSpPr txBox="1"/>
+          <p:nvPr/>
+        </p:nvSpPr>
+        <p:spPr>
+          <a:xfrm>
+            <a:off x="6534462" y="6392903"/>
+            <a:ext cx="2356320" cy="307777"/>
+          </a:xfrm>
+          <a:prstGeom prst="rect">
+            <a:avLst/>
+          </a:prstGeom>
+          <a:noFill/>
+        </p:spPr>
+        <p:txBody>
+          <a:bodyPr wrap="square" rtlCol="0">
+            <a:spAutoFit/>
+          </a:bodyPr>
+          <a:lstStyle/>
+          <a:p>
+            <a:pPr algn="just"/>
+            <a:r>
+              <a:rPr lang="pt-BR" dirty="0">
+                <a:solidFill>
+                  <a:schemeClr val="bg1"/>
+                </a:solidFill>
+                <a:latin typeface="Verdana" panose="020B0604030504040204" pitchFamily="34" charset="0"/>
+                <a:ea typeface="Verdana" panose="020B0604030504040204" pitchFamily="34" charset="0"/>
+                <a:cs typeface="Calibri" panose="020F0502020204030204" pitchFamily="34" charset="0"/>
+              </a:rPr>
+              <a:t>Prof. Marcelo Bernardes</a:t>
+            </a:r>
+            <a:endParaRPr lang="pt-BR" b="1" dirty="0">
+              <a:solidFill>
+                <a:schemeClr val="bg1"/>
+              </a:solidFill>
+              <a:latin typeface="Verdana" panose="020B0604030504040204" pitchFamily="34" charset="0"/>
+              <a:ea typeface="Verdana" panose="020B0604030504040204" pitchFamily="34" charset="0"/>
+              <a:cs typeface="Calibri" panose="020F0502020204030204" pitchFamily="34" charset="0"/>
             </a:endParaRPr>
           </a:p>
         </p:txBody>

</xml_diff>